<commit_message>
Updating visualisations in presentation
</commit_message>
<xml_diff>
--- a/Illumina-paired-end-read-sequencing-simulator.pptx
+++ b/Illumina-paired-end-read-sequencing-simulator.pptx
@@ -123,7 +123,7 @@
   </p:defaultTextStyle>
   <p:extLst>
     <p:ext uri="{EFAFB233-063F-42B5-8137-9DF3F51BA10A}">
-      <p15:sldGuideLst xmlns:p15="http://schemas.microsoft.com/office/powerpoint/2012/main">
+      <p15:sldGuideLst xmlns:p15="http://schemas.microsoft.com/office/powerpoint/2012/main" xmlns="">
         <p15:guide id="1" orient="horz" pos="2160">
           <p15:clr>
             <a:srgbClr val="A4A3A4"/>
@@ -885,7 +885,7 @@
           <a:p>
             <a:fld id="{DC34BFB0-FF04-49CB-B1AB-48E02DCE1F40}" type="datetimeFigureOut">
               <a:rPr lang="sr-Latn-RS" smtClean="0"/>
-              <a:t>04.06.2019.</a:t>
+              <a:t>6.6.2019.</a:t>
             </a:fld>
             <a:endParaRPr lang="sr-Latn-RS"/>
           </a:p>
@@ -945,7 +945,7 @@
   </p:clrMapOvr>
   <p:extLst>
     <p:ext uri="{DCECCB84-F9BA-43D5-87BE-67443E8EF086}">
-      <p15:sldGuideLst xmlns:p15="http://schemas.microsoft.com/office/powerpoint/2012/main"/>
+      <p15:sldGuideLst xmlns:p15="http://schemas.microsoft.com/office/powerpoint/2012/main" xmlns=""/>
     </p:ext>
   </p:extLst>
 </p:sldLayout>
@@ -1141,7 +1141,7 @@
           <a:p>
             <a:fld id="{DC34BFB0-FF04-49CB-B1AB-48E02DCE1F40}" type="datetimeFigureOut">
               <a:rPr lang="sr-Latn-RS" smtClean="0"/>
-              <a:t>04.06.2019.</a:t>
+              <a:t>6.6.2019.</a:t>
             </a:fld>
             <a:endParaRPr lang="sr-Latn-RS"/>
           </a:p>
@@ -1455,7 +1455,7 @@
           <a:p>
             <a:fld id="{DC34BFB0-FF04-49CB-B1AB-48E02DCE1F40}" type="datetimeFigureOut">
               <a:rPr lang="sr-Latn-RS" smtClean="0"/>
-              <a:t>04.06.2019.</a:t>
+              <a:t>6.6.2019.</a:t>
             </a:fld>
             <a:endParaRPr lang="sr-Latn-RS"/>
           </a:p>
@@ -1788,7 +1788,7 @@
           <a:p>
             <a:fld id="{DC34BFB0-FF04-49CB-B1AB-48E02DCE1F40}" type="datetimeFigureOut">
               <a:rPr lang="sr-Latn-RS" smtClean="0"/>
-              <a:t>04.06.2019.</a:t>
+              <a:t>6.6.2019.</a:t>
             </a:fld>
             <a:endParaRPr lang="sr-Latn-RS"/>
           </a:p>
@@ -2102,7 +2102,7 @@
           <a:p>
             <a:fld id="{DC34BFB0-FF04-49CB-B1AB-48E02DCE1F40}" type="datetimeFigureOut">
               <a:rPr lang="sr-Latn-RS" smtClean="0"/>
-              <a:t>04.06.2019.</a:t>
+              <a:t>6.6.2019.</a:t>
             </a:fld>
             <a:endParaRPr lang="sr-Latn-RS"/>
           </a:p>
@@ -2495,7 +2495,7 @@
           <a:p>
             <a:fld id="{DC34BFB0-FF04-49CB-B1AB-48E02DCE1F40}" type="datetimeFigureOut">
               <a:rPr lang="sr-Latn-RS" smtClean="0"/>
-              <a:t>04.06.2019.</a:t>
+              <a:t>6.6.2019.</a:t>
             </a:fld>
             <a:endParaRPr lang="sr-Latn-RS"/>
           </a:p>
@@ -2665,7 +2665,7 @@
           <a:p>
             <a:fld id="{DC34BFB0-FF04-49CB-B1AB-48E02DCE1F40}" type="datetimeFigureOut">
               <a:rPr lang="sr-Latn-RS" smtClean="0"/>
-              <a:t>04.06.2019.</a:t>
+              <a:t>6.6.2019.</a:t>
             </a:fld>
             <a:endParaRPr lang="sr-Latn-RS"/>
           </a:p>
@@ -2845,7 +2845,7 @@
           <a:p>
             <a:fld id="{DC34BFB0-FF04-49CB-B1AB-48E02DCE1F40}" type="datetimeFigureOut">
               <a:rPr lang="sr-Latn-RS" smtClean="0"/>
-              <a:t>04.06.2019.</a:t>
+              <a:t>6.6.2019.</a:t>
             </a:fld>
             <a:endParaRPr lang="sr-Latn-RS"/>
           </a:p>
@@ -3015,7 +3015,7 @@
           <a:p>
             <a:fld id="{DC34BFB0-FF04-49CB-B1AB-48E02DCE1F40}" type="datetimeFigureOut">
               <a:rPr lang="sr-Latn-RS" smtClean="0"/>
-              <a:t>04.06.2019.</a:t>
+              <a:t>6.6.2019.</a:t>
             </a:fld>
             <a:endParaRPr lang="sr-Latn-RS"/>
           </a:p>
@@ -3262,7 +3262,7 @@
           <a:p>
             <a:fld id="{DC34BFB0-FF04-49CB-B1AB-48E02DCE1F40}" type="datetimeFigureOut">
               <a:rPr lang="sr-Latn-RS" smtClean="0"/>
-              <a:t>04.06.2019.</a:t>
+              <a:t>6.6.2019.</a:t>
             </a:fld>
             <a:endParaRPr lang="sr-Latn-RS"/>
           </a:p>
@@ -3494,7 +3494,7 @@
           <a:p>
             <a:fld id="{DC34BFB0-FF04-49CB-B1AB-48E02DCE1F40}" type="datetimeFigureOut">
               <a:rPr lang="sr-Latn-RS" smtClean="0"/>
-              <a:t>04.06.2019.</a:t>
+              <a:t>6.6.2019.</a:t>
             </a:fld>
             <a:endParaRPr lang="sr-Latn-RS"/>
           </a:p>
@@ -3868,7 +3868,7 @@
           <a:p>
             <a:fld id="{DC34BFB0-FF04-49CB-B1AB-48E02DCE1F40}" type="datetimeFigureOut">
               <a:rPr lang="sr-Latn-RS" smtClean="0"/>
-              <a:t>04.06.2019.</a:t>
+              <a:t>6.6.2019.</a:t>
             </a:fld>
             <a:endParaRPr lang="sr-Latn-RS"/>
           </a:p>
@@ -3991,7 +3991,7 @@
           <a:p>
             <a:fld id="{DC34BFB0-FF04-49CB-B1AB-48E02DCE1F40}" type="datetimeFigureOut">
               <a:rPr lang="sr-Latn-RS" smtClean="0"/>
-              <a:t>04.06.2019.</a:t>
+              <a:t>6.6.2019.</a:t>
             </a:fld>
             <a:endParaRPr lang="sr-Latn-RS"/>
           </a:p>
@@ -4086,7 +4086,7 @@
           <a:p>
             <a:fld id="{DC34BFB0-FF04-49CB-B1AB-48E02DCE1F40}" type="datetimeFigureOut">
               <a:rPr lang="sr-Latn-RS" smtClean="0"/>
-              <a:t>04.06.2019.</a:t>
+              <a:t>6.6.2019.</a:t>
             </a:fld>
             <a:endParaRPr lang="sr-Latn-RS"/>
           </a:p>
@@ -4146,7 +4146,7 @@
   </p:clrMapOvr>
   <p:extLst>
     <p:ext uri="{DCECCB84-F9BA-43D5-87BE-67443E8EF086}">
-      <p15:sldGuideLst xmlns:p15="http://schemas.microsoft.com/office/powerpoint/2012/main"/>
+      <p15:sldGuideLst xmlns:p15="http://schemas.microsoft.com/office/powerpoint/2012/main" xmlns=""/>
     </p:ext>
   </p:extLst>
 </p:sldLayout>
@@ -4346,7 +4346,7 @@
           <a:p>
             <a:fld id="{DC34BFB0-FF04-49CB-B1AB-48E02DCE1F40}" type="datetimeFigureOut">
               <a:rPr lang="sr-Latn-RS" smtClean="0"/>
-              <a:t>04.06.2019.</a:t>
+              <a:t>6.6.2019.</a:t>
             </a:fld>
             <a:endParaRPr lang="sr-Latn-RS"/>
           </a:p>
@@ -4406,7 +4406,7 @@
   </p:clrMapOvr>
   <p:extLst>
     <p:ext uri="{DCECCB84-F9BA-43D5-87BE-67443E8EF086}">
-      <p15:sldGuideLst xmlns:p15="http://schemas.microsoft.com/office/powerpoint/2012/main"/>
+      <p15:sldGuideLst xmlns:p15="http://schemas.microsoft.com/office/powerpoint/2012/main" xmlns=""/>
     </p:ext>
   </p:extLst>
 </p:sldLayout>
@@ -4656,7 +4656,7 @@
           <a:p>
             <a:fld id="{DC34BFB0-FF04-49CB-B1AB-48E02DCE1F40}" type="datetimeFigureOut">
               <a:rPr lang="sr-Latn-RS" smtClean="0"/>
-              <a:t>04.06.2019.</a:t>
+              <a:t>6.6.2019.</a:t>
             </a:fld>
             <a:endParaRPr lang="sr-Latn-RS"/>
           </a:p>
@@ -5358,7 +5358,7 @@
           <a:p>
             <a:fld id="{DC34BFB0-FF04-49CB-B1AB-48E02DCE1F40}" type="datetimeFigureOut">
               <a:rPr lang="sr-Latn-RS" smtClean="0"/>
-              <a:t>04.06.2019.</a:t>
+              <a:t>6.6.2019.</a:t>
             </a:fld>
             <a:endParaRPr lang="sr-Latn-RS"/>
           </a:p>
@@ -5864,7 +5864,7 @@
   </p:txStyles>
   <p:extLst>
     <p:ext uri="{27BBF7A9-308A-43DC-89C8-2F10F3537804}">
-      <p15:sldGuideLst xmlns:p15="http://schemas.microsoft.com/office/powerpoint/2012/main"/>
+      <p15:sldGuideLst xmlns:p15="http://schemas.microsoft.com/office/powerpoint/2012/main" xmlns=""/>
     </p:ext>
   </p:extLst>
 </p:sldMaster>
@@ -5892,7 +5892,7 @@
           <p:cNvPr id="2" name="Title 1">
             <a:extLst>
               <a:ext uri="{FF2B5EF4-FFF2-40B4-BE49-F238E27FC236}">
-                <a16:creationId xmlns:a16="http://schemas.microsoft.com/office/drawing/2014/main" id="{C8631A9F-7570-4462-8DB6-0EFEA0CD5962}"/>
+                <a16:creationId xmlns:a16="http://schemas.microsoft.com/office/drawing/2014/main" xmlns="" id="{C8631A9F-7570-4462-8DB6-0EFEA0CD5962}"/>
               </a:ext>
             </a:extLst>
           </p:cNvPr>
@@ -5927,7 +5927,7 @@
           <p:cNvPr id="3" name="Subtitle 2">
             <a:extLst>
               <a:ext uri="{FF2B5EF4-FFF2-40B4-BE49-F238E27FC236}">
-                <a16:creationId xmlns:a16="http://schemas.microsoft.com/office/drawing/2014/main" id="{17C3CAF1-5052-4EAD-B72C-730F84C8A1C1}"/>
+                <a16:creationId xmlns:a16="http://schemas.microsoft.com/office/drawing/2014/main" xmlns="" id="{17C3CAF1-5052-4EAD-B72C-730F84C8A1C1}"/>
               </a:ext>
             </a:extLst>
           </p:cNvPr>
@@ -6022,9 +6022,58 @@
           </a:p>
         </p:txBody>
       </p:sp>
+      <p:sp>
+        <p:nvSpPr>
+          <p:cNvPr id="5" name="TextBox 4">
+            <a:extLst>
+              <a:ext uri="{FF2B5EF4-FFF2-40B4-BE49-F238E27FC236}">
+                <a16:creationId xmlns:a16="http://schemas.microsoft.com/office/drawing/2014/main" xmlns="" id="{64FA81B3-F970-415E-B650-4B8A394F1E52}"/>
+              </a:ext>
+            </a:extLst>
+          </p:cNvPr>
+          <p:cNvSpPr txBox="1"/>
+          <p:nvPr/>
+        </p:nvSpPr>
+        <p:spPr>
+          <a:xfrm>
+            <a:off x="650928" y="6137775"/>
+            <a:ext cx="7987746" cy="338554"/>
+          </a:xfrm>
+          <a:prstGeom prst="rect">
+            <a:avLst/>
+          </a:prstGeom>
+          <a:noFill/>
+        </p:spPr>
+        <p:txBody>
+          <a:bodyPr wrap="square" rtlCol="0">
+            <a:spAutoFit/>
+          </a:bodyPr>
+          <a:lstStyle/>
+          <a:p>
+            <a:pPr algn="ctr"/>
+            <a:r>
+              <a:rPr lang="en-US" sz="1600" dirty="0" err="1"/>
+              <a:t>Ananas</a:t>
+            </a:r>
+            <a:r>
+              <a:rPr lang="en-US" sz="1600" dirty="0"/>
+              <a:t> </a:t>
+            </a:r>
+            <a:r>
+              <a:rPr lang="en-US" sz="1600" dirty="0" err="1"/>
+              <a:t>comosus</a:t>
+            </a:r>
+            <a:r>
+              <a:rPr lang="en-US" sz="1600" dirty="0"/>
+              <a:t> chromosome 23 (~8M base pairs)</a:t>
+            </a:r>
+            <a:endParaRPr lang="sr-Latn-RS" sz="1600" dirty="0"/>
+          </a:p>
+        </p:txBody>
+      </p:sp>
       <p:pic>
         <p:nvPicPr>
-          <p:cNvPr id="4" name="Content Placeholder 3"/>
+          <p:cNvPr id="6" name="Content Placeholder 5"/>
           <p:cNvPicPr>
             <a:picLocks noGrp="1" noChangeAspect="1"/>
           </p:cNvPicPr>
@@ -6046,60 +6095,11 @@
         </p:blipFill>
         <p:spPr>
           <a:xfrm>
-            <a:off x="503025" y="1388203"/>
-            <a:ext cx="8687470" cy="4491089"/>
+            <a:off x="875088" y="1333163"/>
+            <a:ext cx="7885830" cy="4804612"/>
           </a:xfrm>
         </p:spPr>
       </p:pic>
-      <p:sp>
-        <p:nvSpPr>
-          <p:cNvPr id="5" name="TextBox 4">
-            <a:extLst>
-              <a:ext uri="{FF2B5EF4-FFF2-40B4-BE49-F238E27FC236}">
-                <a16:creationId xmlns:a16="http://schemas.microsoft.com/office/drawing/2014/main" id="{64FA81B3-F970-415E-B650-4B8A394F1E52}"/>
-              </a:ext>
-            </a:extLst>
-          </p:cNvPr>
-          <p:cNvSpPr txBox="1"/>
-          <p:nvPr/>
-        </p:nvSpPr>
-        <p:spPr>
-          <a:xfrm>
-            <a:off x="650928" y="5799221"/>
-            <a:ext cx="7987746" cy="338554"/>
-          </a:xfrm>
-          <a:prstGeom prst="rect">
-            <a:avLst/>
-          </a:prstGeom>
-          <a:noFill/>
-        </p:spPr>
-        <p:txBody>
-          <a:bodyPr wrap="square" rtlCol="0">
-            <a:spAutoFit/>
-          </a:bodyPr>
-          <a:lstStyle/>
-          <a:p>
-            <a:pPr algn="ctr"/>
-            <a:r>
-              <a:rPr lang="en-US" sz="1600" dirty="0" err="1"/>
-              <a:t>Ananas</a:t>
-            </a:r>
-            <a:r>
-              <a:rPr lang="en-US" sz="1600" dirty="0"/>
-              <a:t> </a:t>
-            </a:r>
-            <a:r>
-              <a:rPr lang="en-US" sz="1600" dirty="0" err="1"/>
-              <a:t>comosus</a:t>
-            </a:r>
-            <a:r>
-              <a:rPr lang="en-US" sz="1600" dirty="0"/>
-              <a:t> chromosome 23 (~8M base pairs)</a:t>
-            </a:r>
-            <a:endParaRPr lang="sr-Latn-RS" sz="1600" dirty="0"/>
-          </a:p>
-        </p:txBody>
-      </p:sp>
     </p:spTree>
     <p:extLst>
       <p:ext uri="{BB962C8B-B14F-4D97-AF65-F5344CB8AC3E}">
@@ -6135,7 +6135,7 @@
           <p:cNvPr id="2" name="Title 1">
             <a:extLst>
               <a:ext uri="{FF2B5EF4-FFF2-40B4-BE49-F238E27FC236}">
-                <a16:creationId xmlns:a16="http://schemas.microsoft.com/office/drawing/2014/main" id="{1AC4981F-FACA-4D31-9AC1-59FA77BD357C}"/>
+                <a16:creationId xmlns:a16="http://schemas.microsoft.com/office/drawing/2014/main" xmlns="" id="{1AC4981F-FACA-4D31-9AC1-59FA77BD357C}"/>
               </a:ext>
             </a:extLst>
           </p:cNvPr>
@@ -6167,9 +6167,54 @@
           </a:p>
         </p:txBody>
       </p:sp>
+      <p:sp>
+        <p:nvSpPr>
+          <p:cNvPr id="5" name="TextBox 4">
+            <a:extLst>
+              <a:ext uri="{FF2B5EF4-FFF2-40B4-BE49-F238E27FC236}">
+                <a16:creationId xmlns:a16="http://schemas.microsoft.com/office/drawing/2014/main" xmlns="" id="{F31EEF5A-401D-49F8-B92B-9D6CE1A5FCA7}"/>
+              </a:ext>
+            </a:extLst>
+          </p:cNvPr>
+          <p:cNvSpPr txBox="1"/>
+          <p:nvPr/>
+        </p:nvSpPr>
+        <p:spPr>
+          <a:xfrm>
+            <a:off x="843582" y="6191574"/>
+            <a:ext cx="7987746" cy="338554"/>
+          </a:xfrm>
+          <a:prstGeom prst="rect">
+            <a:avLst/>
+          </a:prstGeom>
+          <a:noFill/>
+        </p:spPr>
+        <p:txBody>
+          <a:bodyPr wrap="square" rtlCol="0">
+            <a:spAutoFit/>
+          </a:bodyPr>
+          <a:lstStyle/>
+          <a:p>
+            <a:pPr algn="ctr"/>
+            <a:r>
+              <a:rPr lang="en-US" sz="1600" dirty="0"/>
+              <a:t>Gorilla </a:t>
+            </a:r>
+            <a:r>
+              <a:rPr lang="en-US" sz="1600" dirty="0" err="1"/>
+              <a:t>gorilla</a:t>
+            </a:r>
+            <a:r>
+              <a:rPr lang="en-US" sz="1600" dirty="0"/>
+              <a:t> chromosome 16 (~80M base pairs)</a:t>
+            </a:r>
+            <a:endParaRPr lang="sr-Latn-RS" sz="1600" dirty="0"/>
+          </a:p>
+        </p:txBody>
+      </p:sp>
       <p:pic>
         <p:nvPicPr>
-          <p:cNvPr id="4" name="Picture 3"/>
+          <p:cNvPr id="3" name="Picture 2"/>
           <p:cNvPicPr>
             <a:picLocks noChangeAspect="1"/>
           </p:cNvPicPr>
@@ -6189,59 +6234,14 @@
         </p:blipFill>
         <p:spPr>
           <a:xfrm>
-            <a:off x="577902" y="1370528"/>
-            <a:ext cx="8660153" cy="4821046"/>
+            <a:off x="1487210" y="1438274"/>
+            <a:ext cx="7115518" cy="4643345"/>
           </a:xfrm>
           <a:prstGeom prst="rect">
             <a:avLst/>
           </a:prstGeom>
         </p:spPr>
       </p:pic>
-      <p:sp>
-        <p:nvSpPr>
-          <p:cNvPr id="5" name="TextBox 4">
-            <a:extLst>
-              <a:ext uri="{FF2B5EF4-FFF2-40B4-BE49-F238E27FC236}">
-                <a16:creationId xmlns:a16="http://schemas.microsoft.com/office/drawing/2014/main" id="{F31EEF5A-401D-49F8-B92B-9D6CE1A5FCA7}"/>
-              </a:ext>
-            </a:extLst>
-          </p:cNvPr>
-          <p:cNvSpPr txBox="1"/>
-          <p:nvPr/>
-        </p:nvSpPr>
-        <p:spPr>
-          <a:xfrm>
-            <a:off x="614982" y="5853020"/>
-            <a:ext cx="7987746" cy="338554"/>
-          </a:xfrm>
-          <a:prstGeom prst="rect">
-            <a:avLst/>
-          </a:prstGeom>
-          <a:noFill/>
-        </p:spPr>
-        <p:txBody>
-          <a:bodyPr wrap="square" rtlCol="0">
-            <a:spAutoFit/>
-          </a:bodyPr>
-          <a:lstStyle/>
-          <a:p>
-            <a:pPr algn="ctr"/>
-            <a:r>
-              <a:rPr lang="en-US" sz="1600" dirty="0"/>
-              <a:t>Gorilla </a:t>
-            </a:r>
-            <a:r>
-              <a:rPr lang="en-US" sz="1600" dirty="0" err="1"/>
-              <a:t>gorilla</a:t>
-            </a:r>
-            <a:r>
-              <a:rPr lang="en-US" sz="1600" dirty="0"/>
-              <a:t> chromosome 16 (~80M base pairs)</a:t>
-            </a:r>
-            <a:endParaRPr lang="sr-Latn-RS" sz="1600" dirty="0"/>
-          </a:p>
-        </p:txBody>
-      </p:sp>
     </p:spTree>
     <p:extLst>
       <p:ext uri="{BB962C8B-B14F-4D97-AF65-F5344CB8AC3E}">
@@ -6302,9 +6302,58 @@
           </a:p>
         </p:txBody>
       </p:sp>
+      <p:sp>
+        <p:nvSpPr>
+          <p:cNvPr id="3" name="TextBox 2">
+            <a:extLst>
+              <a:ext uri="{FF2B5EF4-FFF2-40B4-BE49-F238E27FC236}">
+                <a16:creationId xmlns:a16="http://schemas.microsoft.com/office/drawing/2014/main" xmlns="" id="{F4949662-0FB6-4E5C-990C-06D0EFC77E0D}"/>
+              </a:ext>
+            </a:extLst>
+          </p:cNvPr>
+          <p:cNvSpPr txBox="1"/>
+          <p:nvPr/>
+        </p:nvSpPr>
+        <p:spPr>
+          <a:xfrm>
+            <a:off x="650928" y="6218321"/>
+            <a:ext cx="7987746" cy="338554"/>
+          </a:xfrm>
+          <a:prstGeom prst="rect">
+            <a:avLst/>
+          </a:prstGeom>
+          <a:noFill/>
+        </p:spPr>
+        <p:txBody>
+          <a:bodyPr wrap="square" rtlCol="0">
+            <a:spAutoFit/>
+          </a:bodyPr>
+          <a:lstStyle/>
+          <a:p>
+            <a:pPr algn="ctr"/>
+            <a:r>
+              <a:rPr lang="sr-Latn-RS" sz="1600" dirty="0"/>
+              <a:t>Spodoptera</a:t>
+            </a:r>
+            <a:r>
+              <a:rPr lang="en-US" sz="1600" dirty="0"/>
+              <a:t> </a:t>
+            </a:r>
+            <a:r>
+              <a:rPr lang="sr-Latn-RS" sz="1600" dirty="0"/>
+              <a:t>litura</a:t>
+            </a:r>
+            <a:r>
+              <a:rPr lang="en-US" sz="1600" dirty="0"/>
+              <a:t> chromosome 12 (~10M base pairs)</a:t>
+            </a:r>
+            <a:endParaRPr lang="sr-Latn-RS" sz="1600" dirty="0"/>
+          </a:p>
+        </p:txBody>
+      </p:sp>
       <p:pic>
         <p:nvPicPr>
-          <p:cNvPr id="6" name="Picture 5"/>
+          <p:cNvPr id="4" name="Picture 3"/>
           <p:cNvPicPr>
             <a:picLocks noChangeAspect="1"/>
           </p:cNvPicPr>
@@ -6324,63 +6373,14 @@
         </p:blipFill>
         <p:spPr>
           <a:xfrm>
-            <a:off x="410705" y="1541024"/>
-            <a:ext cx="8493071" cy="4495960"/>
+            <a:off x="370002" y="1448418"/>
+            <a:ext cx="9104664" cy="4552332"/>
           </a:xfrm>
           <a:prstGeom prst="rect">
             <a:avLst/>
           </a:prstGeom>
         </p:spPr>
       </p:pic>
-      <p:sp>
-        <p:nvSpPr>
-          <p:cNvPr id="3" name="TextBox 2">
-            <a:extLst>
-              <a:ext uri="{FF2B5EF4-FFF2-40B4-BE49-F238E27FC236}">
-                <a16:creationId xmlns:a16="http://schemas.microsoft.com/office/drawing/2014/main" id="{F4949662-0FB6-4E5C-990C-06D0EFC77E0D}"/>
-              </a:ext>
-            </a:extLst>
-          </p:cNvPr>
-          <p:cNvSpPr txBox="1"/>
-          <p:nvPr/>
-        </p:nvSpPr>
-        <p:spPr>
-          <a:xfrm>
-            <a:off x="650928" y="5799221"/>
-            <a:ext cx="7987746" cy="338554"/>
-          </a:xfrm>
-          <a:prstGeom prst="rect">
-            <a:avLst/>
-          </a:prstGeom>
-          <a:noFill/>
-        </p:spPr>
-        <p:txBody>
-          <a:bodyPr wrap="square" rtlCol="0">
-            <a:spAutoFit/>
-          </a:bodyPr>
-          <a:lstStyle/>
-          <a:p>
-            <a:pPr algn="ctr"/>
-            <a:r>
-              <a:rPr lang="sr-Latn-RS" sz="1600" dirty="0"/>
-              <a:t>Spodoptera</a:t>
-            </a:r>
-            <a:r>
-              <a:rPr lang="en-US" sz="1600" dirty="0"/>
-              <a:t> </a:t>
-            </a:r>
-            <a:r>
-              <a:rPr lang="sr-Latn-RS" sz="1600" dirty="0"/>
-              <a:t>litura</a:t>
-            </a:r>
-            <a:r>
-              <a:rPr lang="en-US" sz="1600" dirty="0"/>
-              <a:t> chromosome 12 (~10M base pairs)</a:t>
-            </a:r>
-            <a:endParaRPr lang="sr-Latn-RS" sz="1600" dirty="0"/>
-          </a:p>
-        </p:txBody>
-      </p:sp>
     </p:spTree>
     <p:extLst>
       <p:ext uri="{BB962C8B-B14F-4D97-AF65-F5344CB8AC3E}">
@@ -6416,7 +6416,7 @@
           <p:cNvPr id="2" name="Title 1">
             <a:extLst>
               <a:ext uri="{FF2B5EF4-FFF2-40B4-BE49-F238E27FC236}">
-                <a16:creationId xmlns:a16="http://schemas.microsoft.com/office/drawing/2014/main" id="{0DB7DD61-7AEB-4A39-B455-36AC2755A88F}"/>
+                <a16:creationId xmlns:a16="http://schemas.microsoft.com/office/drawing/2014/main" xmlns="" id="{0DB7DD61-7AEB-4A39-B455-36AC2755A88F}"/>
               </a:ext>
             </a:extLst>
           </p:cNvPr>
@@ -6445,7 +6445,7 @@
           <p:cNvPr id="3" name="Content Placeholder 2">
             <a:extLst>
               <a:ext uri="{FF2B5EF4-FFF2-40B4-BE49-F238E27FC236}">
-                <a16:creationId xmlns:a16="http://schemas.microsoft.com/office/drawing/2014/main" id="{C73B7651-EA97-40ED-A41A-A5E865318B20}"/>
+                <a16:creationId xmlns:a16="http://schemas.microsoft.com/office/drawing/2014/main" xmlns="" id="{C73B7651-EA97-40ED-A41A-A5E865318B20}"/>
               </a:ext>
             </a:extLst>
           </p:cNvPr>
@@ -6529,7 +6529,7 @@
           <p:cNvPr id="2" name="Title 1">
             <a:extLst>
               <a:ext uri="{FF2B5EF4-FFF2-40B4-BE49-F238E27FC236}">
-                <a16:creationId xmlns:a16="http://schemas.microsoft.com/office/drawing/2014/main" id="{149E31EA-0191-4E6A-B4AB-5245EE3F2B40}"/>
+                <a16:creationId xmlns:a16="http://schemas.microsoft.com/office/drawing/2014/main" xmlns="" id="{149E31EA-0191-4E6A-B4AB-5245EE3F2B40}"/>
               </a:ext>
             </a:extLst>
           </p:cNvPr>
@@ -6554,9 +6554,58 @@
           </a:p>
         </p:txBody>
       </p:sp>
+      <p:sp>
+        <p:nvSpPr>
+          <p:cNvPr id="5" name="TextBox 4">
+            <a:extLst>
+              <a:ext uri="{FF2B5EF4-FFF2-40B4-BE49-F238E27FC236}">
+                <a16:creationId xmlns:a16="http://schemas.microsoft.com/office/drawing/2014/main" xmlns="" id="{2FD1F78F-5489-476D-8A15-4B001527971A}"/>
+              </a:ext>
+            </a:extLst>
+          </p:cNvPr>
+          <p:cNvSpPr txBox="1"/>
+          <p:nvPr/>
+        </p:nvSpPr>
+        <p:spPr>
+          <a:xfrm>
+            <a:off x="650928" y="6256421"/>
+            <a:ext cx="7987746" cy="338554"/>
+          </a:xfrm>
+          <a:prstGeom prst="rect">
+            <a:avLst/>
+          </a:prstGeom>
+          <a:noFill/>
+        </p:spPr>
+        <p:txBody>
+          <a:bodyPr wrap="square" rtlCol="0">
+            <a:spAutoFit/>
+          </a:bodyPr>
+          <a:lstStyle/>
+          <a:p>
+            <a:pPr algn="ctr"/>
+            <a:r>
+              <a:rPr lang="en-US" sz="1600" dirty="0" err="1"/>
+              <a:t>Ananas</a:t>
+            </a:r>
+            <a:r>
+              <a:rPr lang="en-US" sz="1600" dirty="0"/>
+              <a:t> </a:t>
+            </a:r>
+            <a:r>
+              <a:rPr lang="en-US" sz="1600" dirty="0" err="1"/>
+              <a:t>comosus</a:t>
+            </a:r>
+            <a:r>
+              <a:rPr lang="en-US" sz="1600" dirty="0"/>
+              <a:t> chromosome 23</a:t>
+            </a:r>
+            <a:endParaRPr lang="sr-Latn-RS" sz="1600" dirty="0"/>
+          </a:p>
+        </p:txBody>
+      </p:sp>
       <p:pic>
         <p:nvPicPr>
-          <p:cNvPr id="4" name="Picture 3"/>
+          <p:cNvPr id="3" name="Picture 2"/>
           <p:cNvPicPr>
             <a:picLocks noChangeAspect="1"/>
           </p:cNvPicPr>
@@ -6576,63 +6625,14 @@
         </p:blipFill>
         <p:spPr>
           <a:xfrm>
-            <a:off x="501278" y="1511085"/>
-            <a:ext cx="8608722" cy="4169044"/>
+            <a:off x="800100" y="1290065"/>
+            <a:ext cx="7905750" cy="4965821"/>
           </a:xfrm>
           <a:prstGeom prst="rect">
             <a:avLst/>
           </a:prstGeom>
         </p:spPr>
       </p:pic>
-      <p:sp>
-        <p:nvSpPr>
-          <p:cNvPr id="5" name="TextBox 4">
-            <a:extLst>
-              <a:ext uri="{FF2B5EF4-FFF2-40B4-BE49-F238E27FC236}">
-                <a16:creationId xmlns:a16="http://schemas.microsoft.com/office/drawing/2014/main" id="{2FD1F78F-5489-476D-8A15-4B001527971A}"/>
-              </a:ext>
-            </a:extLst>
-          </p:cNvPr>
-          <p:cNvSpPr txBox="1"/>
-          <p:nvPr/>
-        </p:nvSpPr>
-        <p:spPr>
-          <a:xfrm>
-            <a:off x="650928" y="5799221"/>
-            <a:ext cx="7987746" cy="338554"/>
-          </a:xfrm>
-          <a:prstGeom prst="rect">
-            <a:avLst/>
-          </a:prstGeom>
-          <a:noFill/>
-        </p:spPr>
-        <p:txBody>
-          <a:bodyPr wrap="square" rtlCol="0">
-            <a:spAutoFit/>
-          </a:bodyPr>
-          <a:lstStyle/>
-          <a:p>
-            <a:pPr algn="ctr"/>
-            <a:r>
-              <a:rPr lang="en-US" sz="1600" dirty="0" err="1"/>
-              <a:t>Ananas</a:t>
-            </a:r>
-            <a:r>
-              <a:rPr lang="en-US" sz="1600" dirty="0"/>
-              <a:t> </a:t>
-            </a:r>
-            <a:r>
-              <a:rPr lang="en-US" sz="1600" dirty="0" err="1"/>
-              <a:t>comosus</a:t>
-            </a:r>
-            <a:r>
-              <a:rPr lang="en-US" sz="1600" dirty="0"/>
-              <a:t> chromosome 23</a:t>
-            </a:r>
-            <a:endParaRPr lang="sr-Latn-RS" sz="1600" dirty="0"/>
-          </a:p>
-        </p:txBody>
-      </p:sp>
     </p:spTree>
     <p:extLst>
       <p:ext uri="{BB962C8B-B14F-4D97-AF65-F5344CB8AC3E}">
@@ -6685,9 +6685,54 @@
           </a:p>
         </p:txBody>
       </p:sp>
+      <p:sp>
+        <p:nvSpPr>
+          <p:cNvPr id="5" name="TextBox 4">
+            <a:extLst>
+              <a:ext uri="{FF2B5EF4-FFF2-40B4-BE49-F238E27FC236}">
+                <a16:creationId xmlns:a16="http://schemas.microsoft.com/office/drawing/2014/main" xmlns="" id="{9EF7D689-7DDD-4C30-B11E-934D6284D6F2}"/>
+              </a:ext>
+            </a:extLst>
+          </p:cNvPr>
+          <p:cNvSpPr txBox="1"/>
+          <p:nvPr/>
+        </p:nvSpPr>
+        <p:spPr>
+          <a:xfrm>
+            <a:off x="650928" y="6284996"/>
+            <a:ext cx="7987746" cy="338554"/>
+          </a:xfrm>
+          <a:prstGeom prst="rect">
+            <a:avLst/>
+          </a:prstGeom>
+          <a:noFill/>
+        </p:spPr>
+        <p:txBody>
+          <a:bodyPr wrap="square" rtlCol="0">
+            <a:spAutoFit/>
+          </a:bodyPr>
+          <a:lstStyle/>
+          <a:p>
+            <a:pPr algn="ctr"/>
+            <a:r>
+              <a:rPr lang="en-US" sz="1600" dirty="0"/>
+              <a:t>Gorilla </a:t>
+            </a:r>
+            <a:r>
+              <a:rPr lang="en-US" sz="1600" dirty="0"/>
+              <a:t>gorilla</a:t>
+            </a:r>
+            <a:r>
+              <a:rPr lang="en-US" sz="1600" dirty="0"/>
+              <a:t> chromosome 16</a:t>
+            </a:r>
+            <a:endParaRPr lang="sr-Latn-RS" sz="1600" dirty="0"/>
+          </a:p>
+        </p:txBody>
+      </p:sp>
       <p:pic>
         <p:nvPicPr>
-          <p:cNvPr id="4" name="Picture 3"/>
+          <p:cNvPr id="3" name="Picture 2"/>
           <p:cNvPicPr>
             <a:picLocks noChangeAspect="1"/>
           </p:cNvPicPr>
@@ -6707,59 +6752,14 @@
         </p:blipFill>
         <p:spPr>
           <a:xfrm>
-            <a:off x="325464" y="1485479"/>
-            <a:ext cx="8482063" cy="4563178"/>
+            <a:off x="1295399" y="1278015"/>
+            <a:ext cx="7000875" cy="5014420"/>
           </a:xfrm>
           <a:prstGeom prst="rect">
             <a:avLst/>
           </a:prstGeom>
         </p:spPr>
       </p:pic>
-      <p:sp>
-        <p:nvSpPr>
-          <p:cNvPr id="5" name="TextBox 4">
-            <a:extLst>
-              <a:ext uri="{FF2B5EF4-FFF2-40B4-BE49-F238E27FC236}">
-                <a16:creationId xmlns:a16="http://schemas.microsoft.com/office/drawing/2014/main" id="{9EF7D689-7DDD-4C30-B11E-934D6284D6F2}"/>
-              </a:ext>
-            </a:extLst>
-          </p:cNvPr>
-          <p:cNvSpPr txBox="1"/>
-          <p:nvPr/>
-        </p:nvSpPr>
-        <p:spPr>
-          <a:xfrm>
-            <a:off x="650928" y="5799221"/>
-            <a:ext cx="7987746" cy="338554"/>
-          </a:xfrm>
-          <a:prstGeom prst="rect">
-            <a:avLst/>
-          </a:prstGeom>
-          <a:noFill/>
-        </p:spPr>
-        <p:txBody>
-          <a:bodyPr wrap="square" rtlCol="0">
-            <a:spAutoFit/>
-          </a:bodyPr>
-          <a:lstStyle/>
-          <a:p>
-            <a:pPr algn="ctr"/>
-            <a:r>
-              <a:rPr lang="en-US" sz="1600" dirty="0"/>
-              <a:t>Gorilla </a:t>
-            </a:r>
-            <a:r>
-              <a:rPr lang="en-US" sz="1600" dirty="0" err="1"/>
-              <a:t>gorilla</a:t>
-            </a:r>
-            <a:r>
-              <a:rPr lang="en-US" sz="1600" dirty="0"/>
-              <a:t> chromosome 16</a:t>
-            </a:r>
-            <a:endParaRPr lang="sr-Latn-RS" sz="1600" dirty="0"/>
-          </a:p>
-        </p:txBody>
-      </p:sp>
     </p:spTree>
     <p:extLst>
       <p:ext uri="{BB962C8B-B14F-4D97-AF65-F5344CB8AC3E}">
@@ -6812,9 +6812,58 @@
           </a:p>
         </p:txBody>
       </p:sp>
+      <p:sp>
+        <p:nvSpPr>
+          <p:cNvPr id="4" name="TextBox 3">
+            <a:extLst>
+              <a:ext uri="{FF2B5EF4-FFF2-40B4-BE49-F238E27FC236}">
+                <a16:creationId xmlns:a16="http://schemas.microsoft.com/office/drawing/2014/main" xmlns="" id="{AF4EC383-9F21-47AB-A363-0C89D921158F}"/>
+              </a:ext>
+            </a:extLst>
+          </p:cNvPr>
+          <p:cNvSpPr txBox="1"/>
+          <p:nvPr/>
+        </p:nvSpPr>
+        <p:spPr>
+          <a:xfrm>
+            <a:off x="650928" y="6218321"/>
+            <a:ext cx="7987746" cy="338554"/>
+          </a:xfrm>
+          <a:prstGeom prst="rect">
+            <a:avLst/>
+          </a:prstGeom>
+          <a:noFill/>
+        </p:spPr>
+        <p:txBody>
+          <a:bodyPr wrap="square" rtlCol="0">
+            <a:spAutoFit/>
+          </a:bodyPr>
+          <a:lstStyle/>
+          <a:p>
+            <a:pPr algn="ctr"/>
+            <a:r>
+              <a:rPr lang="sr-Latn-RS" sz="1600" dirty="0"/>
+              <a:t>Spodoptera</a:t>
+            </a:r>
+            <a:r>
+              <a:rPr lang="en-US" sz="1600" dirty="0"/>
+              <a:t> </a:t>
+            </a:r>
+            <a:r>
+              <a:rPr lang="sr-Latn-RS" sz="1600" dirty="0"/>
+              <a:t>litura</a:t>
+            </a:r>
+            <a:r>
+              <a:rPr lang="en-US" sz="1600" dirty="0"/>
+              <a:t> chromosome 12</a:t>
+            </a:r>
+            <a:endParaRPr lang="sr-Latn-RS" sz="1600" dirty="0"/>
+          </a:p>
+        </p:txBody>
+      </p:sp>
       <p:pic>
         <p:nvPicPr>
-          <p:cNvPr id="5" name="Picture 4"/>
+          <p:cNvPr id="3" name="Picture 2"/>
           <p:cNvPicPr>
             <a:picLocks noChangeAspect="1"/>
           </p:cNvPicPr>
@@ -6834,63 +6883,14 @@
         </p:blipFill>
         <p:spPr>
           <a:xfrm>
-            <a:off x="413796" y="1280407"/>
-            <a:ext cx="8505480" cy="4515959"/>
+            <a:off x="571500" y="1390054"/>
+            <a:ext cx="9221660" cy="4675867"/>
           </a:xfrm>
           <a:prstGeom prst="rect">
             <a:avLst/>
           </a:prstGeom>
         </p:spPr>
       </p:pic>
-      <p:sp>
-        <p:nvSpPr>
-          <p:cNvPr id="4" name="TextBox 3">
-            <a:extLst>
-              <a:ext uri="{FF2B5EF4-FFF2-40B4-BE49-F238E27FC236}">
-                <a16:creationId xmlns:a16="http://schemas.microsoft.com/office/drawing/2014/main" id="{AF4EC383-9F21-47AB-A363-0C89D921158F}"/>
-              </a:ext>
-            </a:extLst>
-          </p:cNvPr>
-          <p:cNvSpPr txBox="1"/>
-          <p:nvPr/>
-        </p:nvSpPr>
-        <p:spPr>
-          <a:xfrm>
-            <a:off x="650928" y="5799221"/>
-            <a:ext cx="7987746" cy="338554"/>
-          </a:xfrm>
-          <a:prstGeom prst="rect">
-            <a:avLst/>
-          </a:prstGeom>
-          <a:noFill/>
-        </p:spPr>
-        <p:txBody>
-          <a:bodyPr wrap="square" rtlCol="0">
-            <a:spAutoFit/>
-          </a:bodyPr>
-          <a:lstStyle/>
-          <a:p>
-            <a:pPr algn="ctr"/>
-            <a:r>
-              <a:rPr lang="sr-Latn-RS" sz="1600" dirty="0"/>
-              <a:t>Spodoptera</a:t>
-            </a:r>
-            <a:r>
-              <a:rPr lang="en-US" sz="1600" dirty="0"/>
-              <a:t> </a:t>
-            </a:r>
-            <a:r>
-              <a:rPr lang="sr-Latn-RS" sz="1600" dirty="0"/>
-              <a:t>litura</a:t>
-            </a:r>
-            <a:r>
-              <a:rPr lang="en-US" sz="1600" dirty="0"/>
-              <a:t> chromosome 12</a:t>
-            </a:r>
-            <a:endParaRPr lang="sr-Latn-RS" sz="1600" dirty="0"/>
-          </a:p>
-        </p:txBody>
-      </p:sp>
     </p:spTree>
     <p:extLst>
       <p:ext uri="{BB962C8B-B14F-4D97-AF65-F5344CB8AC3E}">
@@ -6926,7 +6926,7 @@
           <p:cNvPr id="2" name="Title 1">
             <a:extLst>
               <a:ext uri="{FF2B5EF4-FFF2-40B4-BE49-F238E27FC236}">
-                <a16:creationId xmlns:a16="http://schemas.microsoft.com/office/drawing/2014/main" id="{E745E25F-8E2C-4ED9-8B75-E639A508CB5F}"/>
+                <a16:creationId xmlns:a16="http://schemas.microsoft.com/office/drawing/2014/main" xmlns="" id="{E745E25F-8E2C-4ED9-8B75-E639A508CB5F}"/>
               </a:ext>
             </a:extLst>
           </p:cNvPr>
@@ -6955,7 +6955,7 @@
           <p:cNvPr id="3" name="Content Placeholder 2">
             <a:extLst>
               <a:ext uri="{FF2B5EF4-FFF2-40B4-BE49-F238E27FC236}">
-                <a16:creationId xmlns:a16="http://schemas.microsoft.com/office/drawing/2014/main" id="{DB9C3CC4-724A-49E9-9BE1-E1377500ED5D}"/>
+                <a16:creationId xmlns:a16="http://schemas.microsoft.com/office/drawing/2014/main" xmlns="" id="{DB9C3CC4-724A-49E9-9BE1-E1377500ED5D}"/>
               </a:ext>
             </a:extLst>
           </p:cNvPr>
@@ -7054,7 +7054,7 @@
           <p:cNvPr id="3" name="Content Placeholder 2">
             <a:extLst>
               <a:ext uri="{FF2B5EF4-FFF2-40B4-BE49-F238E27FC236}">
-                <a16:creationId xmlns:a16="http://schemas.microsoft.com/office/drawing/2014/main" id="{98BF2886-E311-4574-9831-B765DF89872A}"/>
+                <a16:creationId xmlns:a16="http://schemas.microsoft.com/office/drawing/2014/main" xmlns="" id="{98BF2886-E311-4574-9831-B765DF89872A}"/>
               </a:ext>
             </a:extLst>
           </p:cNvPr>
@@ -7123,7 +7123,7 @@
           <p:cNvPr id="2" name="Title 1">
             <a:extLst>
               <a:ext uri="{FF2B5EF4-FFF2-40B4-BE49-F238E27FC236}">
-                <a16:creationId xmlns:a16="http://schemas.microsoft.com/office/drawing/2014/main" id="{47896FAE-0102-4C15-A2D2-A5A79F2D3C47}"/>
+                <a16:creationId xmlns:a16="http://schemas.microsoft.com/office/drawing/2014/main" xmlns="" id="{47896FAE-0102-4C15-A2D2-A5A79F2D3C47}"/>
               </a:ext>
             </a:extLst>
           </p:cNvPr>
@@ -7157,7 +7157,7 @@
           <p:cNvPr id="3" name="Content Placeholder 2">
             <a:extLst>
               <a:ext uri="{FF2B5EF4-FFF2-40B4-BE49-F238E27FC236}">
-                <a16:creationId xmlns:a16="http://schemas.microsoft.com/office/drawing/2014/main" id="{523D9405-74EA-4EEE-8B0F-DE1C3DD21491}"/>
+                <a16:creationId xmlns:a16="http://schemas.microsoft.com/office/drawing/2014/main" xmlns="" id="{523D9405-74EA-4EEE-8B0F-DE1C3DD21491}"/>
               </a:ext>
             </a:extLst>
           </p:cNvPr>
@@ -7253,7 +7253,7 @@
           <p:cNvPr id="2" name="Title 1">
             <a:extLst>
               <a:ext uri="{FF2B5EF4-FFF2-40B4-BE49-F238E27FC236}">
-                <a16:creationId xmlns:a16="http://schemas.microsoft.com/office/drawing/2014/main" id="{6F12B113-DD86-4097-B65D-E2A9302CFEE6}"/>
+                <a16:creationId xmlns:a16="http://schemas.microsoft.com/office/drawing/2014/main" xmlns="" id="{6F12B113-DD86-4097-B65D-E2A9302CFEE6}"/>
               </a:ext>
             </a:extLst>
           </p:cNvPr>
@@ -7287,7 +7287,7 @@
           <p:cNvPr id="3" name="Content Placeholder 2">
             <a:extLst>
               <a:ext uri="{FF2B5EF4-FFF2-40B4-BE49-F238E27FC236}">
-                <a16:creationId xmlns:a16="http://schemas.microsoft.com/office/drawing/2014/main" id="{315E86A2-E3A6-4E1A-AE05-645BD98A4FB4}"/>
+                <a16:creationId xmlns:a16="http://schemas.microsoft.com/office/drawing/2014/main" xmlns="" id="{315E86A2-E3A6-4E1A-AE05-645BD98A4FB4}"/>
               </a:ext>
             </a:extLst>
           </p:cNvPr>
@@ -7373,7 +7373,7 @@
           <p:cNvPr id="2" name="Title 1">
             <a:extLst>
               <a:ext uri="{FF2B5EF4-FFF2-40B4-BE49-F238E27FC236}">
-                <a16:creationId xmlns:a16="http://schemas.microsoft.com/office/drawing/2014/main" id="{2401EDC9-74B5-4BA2-8996-BDB8BA8BC5C8}"/>
+                <a16:creationId xmlns:a16="http://schemas.microsoft.com/office/drawing/2014/main" xmlns="" id="{2401EDC9-74B5-4BA2-8996-BDB8BA8BC5C8}"/>
               </a:ext>
             </a:extLst>
           </p:cNvPr>
@@ -7409,7 +7409,7 @@
           <p:cNvPr id="3" name="Content Placeholder 2">
             <a:extLst>
               <a:ext uri="{FF2B5EF4-FFF2-40B4-BE49-F238E27FC236}">
-                <a16:creationId xmlns:a16="http://schemas.microsoft.com/office/drawing/2014/main" id="{A98E1D12-FB69-4DEC-9AF6-5EC64DCF1ABE}"/>
+                <a16:creationId xmlns:a16="http://schemas.microsoft.com/office/drawing/2014/main" xmlns="" id="{A98E1D12-FB69-4DEC-9AF6-5EC64DCF1ABE}"/>
               </a:ext>
             </a:extLst>
           </p:cNvPr>
@@ -7559,7 +7559,7 @@
           <p:cNvPr id="7" name="Picture 6" descr="A close up of a map&#10;&#10;Description automatically generated">
             <a:extLst>
               <a:ext uri="{FF2B5EF4-FFF2-40B4-BE49-F238E27FC236}">
-                <a16:creationId xmlns:a16="http://schemas.microsoft.com/office/drawing/2014/main" id="{D7928EF1-9766-46C1-AB93-0F4FC8E8E9C1}"/>
+                <a16:creationId xmlns:a16="http://schemas.microsoft.com/office/drawing/2014/main" xmlns="" id="{D7928EF1-9766-46C1-AB93-0F4FC8E8E9C1}"/>
               </a:ext>
             </a:extLst>
           </p:cNvPr>
@@ -7625,7 +7625,7 @@
           <p:cNvPr id="2" name="Title 1">
             <a:extLst>
               <a:ext uri="{FF2B5EF4-FFF2-40B4-BE49-F238E27FC236}">
-                <a16:creationId xmlns:a16="http://schemas.microsoft.com/office/drawing/2014/main" id="{2401EDC9-74B5-4BA2-8996-BDB8BA8BC5C8}"/>
+                <a16:creationId xmlns:a16="http://schemas.microsoft.com/office/drawing/2014/main" xmlns="" id="{2401EDC9-74B5-4BA2-8996-BDB8BA8BC5C8}"/>
               </a:ext>
             </a:extLst>
           </p:cNvPr>
@@ -7659,7 +7659,7 @@
           <p:cNvPr id="3" name="Content Placeholder 2">
             <a:extLst>
               <a:ext uri="{FF2B5EF4-FFF2-40B4-BE49-F238E27FC236}">
-                <a16:creationId xmlns:a16="http://schemas.microsoft.com/office/drawing/2014/main" id="{A98E1D12-FB69-4DEC-9AF6-5EC64DCF1ABE}"/>
+                <a16:creationId xmlns:a16="http://schemas.microsoft.com/office/drawing/2014/main" xmlns="" id="{A98E1D12-FB69-4DEC-9AF6-5EC64DCF1ABE}"/>
               </a:ext>
             </a:extLst>
           </p:cNvPr>
@@ -7706,7 +7706,7 @@
           <p:cNvPr id="4" name="Picture 3">
             <a:extLst>
               <a:ext uri="{FF2B5EF4-FFF2-40B4-BE49-F238E27FC236}">
-                <a16:creationId xmlns:a16="http://schemas.microsoft.com/office/drawing/2014/main" id="{93F66FB4-91FE-4E1C-B20F-05F3F73DED2F}"/>
+                <a16:creationId xmlns:a16="http://schemas.microsoft.com/office/drawing/2014/main" xmlns="" id="{93F66FB4-91FE-4E1C-B20F-05F3F73DED2F}"/>
               </a:ext>
             </a:extLst>
           </p:cNvPr>
@@ -7765,7 +7765,7 @@
           <p:cNvPr id="2" name="Title 1">
             <a:extLst>
               <a:ext uri="{FF2B5EF4-FFF2-40B4-BE49-F238E27FC236}">
-                <a16:creationId xmlns:a16="http://schemas.microsoft.com/office/drawing/2014/main" id="{2401EDC9-74B5-4BA2-8996-BDB8BA8BC5C8}"/>
+                <a16:creationId xmlns:a16="http://schemas.microsoft.com/office/drawing/2014/main" xmlns="" id="{2401EDC9-74B5-4BA2-8996-BDB8BA8BC5C8}"/>
               </a:ext>
             </a:extLst>
           </p:cNvPr>
@@ -7799,7 +7799,7 @@
           <p:cNvPr id="3" name="Content Placeholder 2">
             <a:extLst>
               <a:ext uri="{FF2B5EF4-FFF2-40B4-BE49-F238E27FC236}">
-                <a16:creationId xmlns:a16="http://schemas.microsoft.com/office/drawing/2014/main" id="{A98E1D12-FB69-4DEC-9AF6-5EC64DCF1ABE}"/>
+                <a16:creationId xmlns:a16="http://schemas.microsoft.com/office/drawing/2014/main" xmlns="" id="{A98E1D12-FB69-4DEC-9AF6-5EC64DCF1ABE}"/>
               </a:ext>
             </a:extLst>
           </p:cNvPr>
@@ -7858,7 +7858,7 @@
           <p:cNvPr id="5" name="Picture 4">
             <a:extLst>
               <a:ext uri="{FF2B5EF4-FFF2-40B4-BE49-F238E27FC236}">
-                <a16:creationId xmlns:a16="http://schemas.microsoft.com/office/drawing/2014/main" id="{30118C7E-293E-445F-9CE7-ECF5FB8C8F71}"/>
+                <a16:creationId xmlns:a16="http://schemas.microsoft.com/office/drawing/2014/main" xmlns="" id="{30118C7E-293E-445F-9CE7-ECF5FB8C8F71}"/>
               </a:ext>
             </a:extLst>
           </p:cNvPr>
@@ -7888,7 +7888,7 @@
           <p:cNvPr id="6" name="Picture 5">
             <a:extLst>
               <a:ext uri="{FF2B5EF4-FFF2-40B4-BE49-F238E27FC236}">
-                <a16:creationId xmlns:a16="http://schemas.microsoft.com/office/drawing/2014/main" id="{84BAC805-CB03-4D48-AF20-EF3A0253FF37}"/>
+                <a16:creationId xmlns:a16="http://schemas.microsoft.com/office/drawing/2014/main" xmlns="" id="{84BAC805-CB03-4D48-AF20-EF3A0253FF37}"/>
               </a:ext>
             </a:extLst>
           </p:cNvPr>
@@ -7918,7 +7918,7 @@
           <p:cNvPr id="7" name="Picture 6">
             <a:extLst>
               <a:ext uri="{FF2B5EF4-FFF2-40B4-BE49-F238E27FC236}">
-                <a16:creationId xmlns:a16="http://schemas.microsoft.com/office/drawing/2014/main" id="{389BB2C0-ECD8-4717-ADF9-A2F0F3B4F07E}"/>
+                <a16:creationId xmlns:a16="http://schemas.microsoft.com/office/drawing/2014/main" xmlns="" id="{389BB2C0-ECD8-4717-ADF9-A2F0F3B4F07E}"/>
               </a:ext>
             </a:extLst>
           </p:cNvPr>
@@ -7948,7 +7948,7 @@
           <p:cNvPr id="8" name="TextBox 7">
             <a:extLst>
               <a:ext uri="{FF2B5EF4-FFF2-40B4-BE49-F238E27FC236}">
-                <a16:creationId xmlns:a16="http://schemas.microsoft.com/office/drawing/2014/main" id="{521B407C-AE04-49A3-9951-0673656E54FD}"/>
+                <a16:creationId xmlns:a16="http://schemas.microsoft.com/office/drawing/2014/main" xmlns="" id="{521B407C-AE04-49A3-9951-0673656E54FD}"/>
               </a:ext>
             </a:extLst>
           </p:cNvPr>
@@ -7986,7 +7986,7 @@
           <p:cNvPr id="9" name="Picture 8">
             <a:extLst>
               <a:ext uri="{FF2B5EF4-FFF2-40B4-BE49-F238E27FC236}">
-                <a16:creationId xmlns:a16="http://schemas.microsoft.com/office/drawing/2014/main" id="{A3F52531-A3EC-4867-896B-C5875BE217ED}"/>
+                <a16:creationId xmlns:a16="http://schemas.microsoft.com/office/drawing/2014/main" xmlns="" id="{A3F52531-A3EC-4867-896B-C5875BE217ED}"/>
               </a:ext>
             </a:extLst>
           </p:cNvPr>
@@ -8046,7 +8046,7 @@
           <p:cNvPr id="2" name="Title 1">
             <a:extLst>
               <a:ext uri="{FF2B5EF4-FFF2-40B4-BE49-F238E27FC236}">
-                <a16:creationId xmlns:a16="http://schemas.microsoft.com/office/drawing/2014/main" id="{1AC4981F-FACA-4D31-9AC1-59FA77BD357C}"/>
+                <a16:creationId xmlns:a16="http://schemas.microsoft.com/office/drawing/2014/main" xmlns="" id="{1AC4981F-FACA-4D31-9AC1-59FA77BD357C}"/>
               </a:ext>
             </a:extLst>
           </p:cNvPr>
@@ -8075,7 +8075,7 @@
           <p:cNvPr id="3" name="Content Placeholder 2">
             <a:extLst>
               <a:ext uri="{FF2B5EF4-FFF2-40B4-BE49-F238E27FC236}">
-                <a16:creationId xmlns:a16="http://schemas.microsoft.com/office/drawing/2014/main" id="{2A7939F4-A9CF-4F40-9438-F0B70A618E08}"/>
+                <a16:creationId xmlns:a16="http://schemas.microsoft.com/office/drawing/2014/main" xmlns="" id="{2A7939F4-A9CF-4F40-9438-F0B70A618E08}"/>
               </a:ext>
             </a:extLst>
           </p:cNvPr>
@@ -8226,7 +8226,7 @@
           <p:cNvPr id="2" name="Title 1">
             <a:extLst>
               <a:ext uri="{FF2B5EF4-FFF2-40B4-BE49-F238E27FC236}">
-                <a16:creationId xmlns:a16="http://schemas.microsoft.com/office/drawing/2014/main" id="{1AC4981F-FACA-4D31-9AC1-59FA77BD357C}"/>
+                <a16:creationId xmlns:a16="http://schemas.microsoft.com/office/drawing/2014/main" xmlns="" id="{1AC4981F-FACA-4D31-9AC1-59FA77BD357C}"/>
               </a:ext>
             </a:extLst>
           </p:cNvPr>
@@ -8255,7 +8255,7 @@
           <p:cNvPr id="3" name="Content Placeholder 2">
             <a:extLst>
               <a:ext uri="{FF2B5EF4-FFF2-40B4-BE49-F238E27FC236}">
-                <a16:creationId xmlns:a16="http://schemas.microsoft.com/office/drawing/2014/main" id="{2A7939F4-A9CF-4F40-9438-F0B70A618E08}"/>
+                <a16:creationId xmlns:a16="http://schemas.microsoft.com/office/drawing/2014/main" xmlns="" id="{2A7939F4-A9CF-4F40-9438-F0B70A618E08}"/>
               </a:ext>
             </a:extLst>
           </p:cNvPr>
@@ -8392,7 +8392,7 @@
           <p:cNvPr id="2" name="Title 1">
             <a:extLst>
               <a:ext uri="{FF2B5EF4-FFF2-40B4-BE49-F238E27FC236}">
-                <a16:creationId xmlns:a16="http://schemas.microsoft.com/office/drawing/2014/main" id="{1AC4981F-FACA-4D31-9AC1-59FA77BD357C}"/>
+                <a16:creationId xmlns:a16="http://schemas.microsoft.com/office/drawing/2014/main" xmlns="" id="{1AC4981F-FACA-4D31-9AC1-59FA77BD357C}"/>
               </a:ext>
             </a:extLst>
           </p:cNvPr>
@@ -8421,7 +8421,7 @@
           <p:cNvPr id="3" name="Content Placeholder 2">
             <a:extLst>
               <a:ext uri="{FF2B5EF4-FFF2-40B4-BE49-F238E27FC236}">
-                <a16:creationId xmlns:a16="http://schemas.microsoft.com/office/drawing/2014/main" id="{2A7939F4-A9CF-4F40-9438-F0B70A618E08}"/>
+                <a16:creationId xmlns:a16="http://schemas.microsoft.com/office/drawing/2014/main" xmlns="" id="{2A7939F4-A9CF-4F40-9438-F0B70A618E08}"/>
               </a:ext>
             </a:extLst>
           </p:cNvPr>
@@ -8499,7 +8499,7 @@
           <p:cNvPr id="4" name="Picture 3">
             <a:extLst>
               <a:ext uri="{FF2B5EF4-FFF2-40B4-BE49-F238E27FC236}">
-                <a16:creationId xmlns:a16="http://schemas.microsoft.com/office/drawing/2014/main" id="{96629BAB-57B1-4670-B6C6-A2B4D8F362AF}"/>
+                <a16:creationId xmlns:a16="http://schemas.microsoft.com/office/drawing/2014/main" xmlns="" id="{96629BAB-57B1-4670-B6C6-A2B4D8F362AF}"/>
               </a:ext>
             </a:extLst>
           </p:cNvPr>
@@ -8788,7 +8788,7 @@
   <a:extraClrSchemeLst/>
   <a:extLst>
     <a:ext uri="{05A4C25C-085E-4340-85A3-A5531E510DB2}">
-      <thm15:themeFamily xmlns:thm15="http://schemas.microsoft.com/office/thememl/2012/main" name="Facet" id="{C0C680CD-088A-49FC-A102-D699147F32B2}" vid="{0B5AB586-D108-4FC1-8368-649FE654B894}"/>
+      <thm15:themeFamily xmlns:thm15="http://schemas.microsoft.com/office/thememl/2012/main" xmlns="" name="Facet" id="{C0C680CD-088A-49FC-A102-D699147F32B2}" vid="{0B5AB586-D108-4FC1-8368-649FE654B894}"/>
     </a:ext>
   </a:extLst>
 </a:theme>

</xml_diff>

<commit_message>
Fixing visualisations and presentation
</commit_message>
<xml_diff>
--- a/Illumina-paired-end-read-sequencing-simulator.pptx
+++ b/Illumina-paired-end-read-sequencing-simulator.pptx
@@ -6022,58 +6022,9 @@
           </a:p>
         </p:txBody>
       </p:sp>
-      <p:sp>
-        <p:nvSpPr>
-          <p:cNvPr id="5" name="TextBox 4">
-            <a:extLst>
-              <a:ext uri="{FF2B5EF4-FFF2-40B4-BE49-F238E27FC236}">
-                <a16:creationId xmlns:a16="http://schemas.microsoft.com/office/drawing/2014/main" xmlns="" id="{64FA81B3-F970-415E-B650-4B8A394F1E52}"/>
-              </a:ext>
-            </a:extLst>
-          </p:cNvPr>
-          <p:cNvSpPr txBox="1"/>
-          <p:nvPr/>
-        </p:nvSpPr>
-        <p:spPr>
-          <a:xfrm>
-            <a:off x="650928" y="6137775"/>
-            <a:ext cx="7987746" cy="338554"/>
-          </a:xfrm>
-          <a:prstGeom prst="rect">
-            <a:avLst/>
-          </a:prstGeom>
-          <a:noFill/>
-        </p:spPr>
-        <p:txBody>
-          <a:bodyPr wrap="square" rtlCol="0">
-            <a:spAutoFit/>
-          </a:bodyPr>
-          <a:lstStyle/>
-          <a:p>
-            <a:pPr algn="ctr"/>
-            <a:r>
-              <a:rPr lang="en-US" sz="1600" dirty="0" err="1"/>
-              <a:t>Ananas</a:t>
-            </a:r>
-            <a:r>
-              <a:rPr lang="en-US" sz="1600" dirty="0"/>
-              <a:t> </a:t>
-            </a:r>
-            <a:r>
-              <a:rPr lang="en-US" sz="1600" dirty="0" err="1"/>
-              <a:t>comosus</a:t>
-            </a:r>
-            <a:r>
-              <a:rPr lang="en-US" sz="1600" dirty="0"/>
-              <a:t> chromosome 23 (~8M base pairs)</a:t>
-            </a:r>
-            <a:endParaRPr lang="sr-Latn-RS" sz="1600" dirty="0"/>
-          </a:p>
-        </p:txBody>
-      </p:sp>
       <p:pic>
         <p:nvPicPr>
-          <p:cNvPr id="6" name="Content Placeholder 5"/>
+          <p:cNvPr id="4" name="Content Placeholder 3"/>
           <p:cNvPicPr>
             <a:picLocks noGrp="1" noChangeAspect="1"/>
           </p:cNvPicPr>
@@ -6095,11 +6046,60 @@
         </p:blipFill>
         <p:spPr>
           <a:xfrm>
-            <a:off x="875088" y="1333163"/>
-            <a:ext cx="7885830" cy="4804612"/>
+            <a:off x="503025" y="1388203"/>
+            <a:ext cx="8687470" cy="4491089"/>
           </a:xfrm>
         </p:spPr>
       </p:pic>
+      <p:sp>
+        <p:nvSpPr>
+          <p:cNvPr id="5" name="TextBox 4">
+            <a:extLst>
+              <a:ext uri="{FF2B5EF4-FFF2-40B4-BE49-F238E27FC236}">
+                <a16:creationId xmlns:a16="http://schemas.microsoft.com/office/drawing/2014/main" xmlns="" id="{64FA81B3-F970-415E-B650-4B8A394F1E52}"/>
+              </a:ext>
+            </a:extLst>
+          </p:cNvPr>
+          <p:cNvSpPr txBox="1"/>
+          <p:nvPr/>
+        </p:nvSpPr>
+        <p:spPr>
+          <a:xfrm>
+            <a:off x="650928" y="5799221"/>
+            <a:ext cx="7987746" cy="338554"/>
+          </a:xfrm>
+          <a:prstGeom prst="rect">
+            <a:avLst/>
+          </a:prstGeom>
+          <a:noFill/>
+        </p:spPr>
+        <p:txBody>
+          <a:bodyPr wrap="square" rtlCol="0">
+            <a:spAutoFit/>
+          </a:bodyPr>
+          <a:lstStyle/>
+          <a:p>
+            <a:pPr algn="ctr"/>
+            <a:r>
+              <a:rPr lang="en-US" sz="1600" dirty="0" err="1"/>
+              <a:t>Ananas</a:t>
+            </a:r>
+            <a:r>
+              <a:rPr lang="en-US" sz="1600" dirty="0"/>
+              <a:t> </a:t>
+            </a:r>
+            <a:r>
+              <a:rPr lang="en-US" sz="1600" dirty="0" err="1"/>
+              <a:t>comosus</a:t>
+            </a:r>
+            <a:r>
+              <a:rPr lang="en-US" sz="1600" dirty="0"/>
+              <a:t> chromosome 23 (~8M base pairs)</a:t>
+            </a:r>
+            <a:endParaRPr lang="sr-Latn-RS" sz="1600" dirty="0"/>
+          </a:p>
+        </p:txBody>
+      </p:sp>
     </p:spTree>
     <p:extLst>
       <p:ext uri="{BB962C8B-B14F-4D97-AF65-F5344CB8AC3E}">
@@ -6167,54 +6167,9 @@
           </a:p>
         </p:txBody>
       </p:sp>
-      <p:sp>
-        <p:nvSpPr>
-          <p:cNvPr id="5" name="TextBox 4">
-            <a:extLst>
-              <a:ext uri="{FF2B5EF4-FFF2-40B4-BE49-F238E27FC236}">
-                <a16:creationId xmlns:a16="http://schemas.microsoft.com/office/drawing/2014/main" xmlns="" id="{F31EEF5A-401D-49F8-B92B-9D6CE1A5FCA7}"/>
-              </a:ext>
-            </a:extLst>
-          </p:cNvPr>
-          <p:cNvSpPr txBox="1"/>
-          <p:nvPr/>
-        </p:nvSpPr>
-        <p:spPr>
-          <a:xfrm>
-            <a:off x="843582" y="6191574"/>
-            <a:ext cx="7987746" cy="338554"/>
-          </a:xfrm>
-          <a:prstGeom prst="rect">
-            <a:avLst/>
-          </a:prstGeom>
-          <a:noFill/>
-        </p:spPr>
-        <p:txBody>
-          <a:bodyPr wrap="square" rtlCol="0">
-            <a:spAutoFit/>
-          </a:bodyPr>
-          <a:lstStyle/>
-          <a:p>
-            <a:pPr algn="ctr"/>
-            <a:r>
-              <a:rPr lang="en-US" sz="1600" dirty="0"/>
-              <a:t>Gorilla </a:t>
-            </a:r>
-            <a:r>
-              <a:rPr lang="en-US" sz="1600" dirty="0" err="1"/>
-              <a:t>gorilla</a:t>
-            </a:r>
-            <a:r>
-              <a:rPr lang="en-US" sz="1600" dirty="0"/>
-              <a:t> chromosome 16 (~80M base pairs)</a:t>
-            </a:r>
-            <a:endParaRPr lang="sr-Latn-RS" sz="1600" dirty="0"/>
-          </a:p>
-        </p:txBody>
-      </p:sp>
       <p:pic>
         <p:nvPicPr>
-          <p:cNvPr id="3" name="Picture 2"/>
+          <p:cNvPr id="4" name="Picture 3"/>
           <p:cNvPicPr>
             <a:picLocks noChangeAspect="1"/>
           </p:cNvPicPr>
@@ -6234,14 +6189,59 @@
         </p:blipFill>
         <p:spPr>
           <a:xfrm>
-            <a:off x="1487210" y="1438274"/>
-            <a:ext cx="7115518" cy="4643345"/>
+            <a:off x="577902" y="1370528"/>
+            <a:ext cx="8660153" cy="4821046"/>
           </a:xfrm>
           <a:prstGeom prst="rect">
             <a:avLst/>
           </a:prstGeom>
         </p:spPr>
       </p:pic>
+      <p:sp>
+        <p:nvSpPr>
+          <p:cNvPr id="5" name="TextBox 4">
+            <a:extLst>
+              <a:ext uri="{FF2B5EF4-FFF2-40B4-BE49-F238E27FC236}">
+                <a16:creationId xmlns:a16="http://schemas.microsoft.com/office/drawing/2014/main" xmlns="" id="{F31EEF5A-401D-49F8-B92B-9D6CE1A5FCA7}"/>
+              </a:ext>
+            </a:extLst>
+          </p:cNvPr>
+          <p:cNvSpPr txBox="1"/>
+          <p:nvPr/>
+        </p:nvSpPr>
+        <p:spPr>
+          <a:xfrm>
+            <a:off x="614982" y="5853020"/>
+            <a:ext cx="7987746" cy="338554"/>
+          </a:xfrm>
+          <a:prstGeom prst="rect">
+            <a:avLst/>
+          </a:prstGeom>
+          <a:noFill/>
+        </p:spPr>
+        <p:txBody>
+          <a:bodyPr wrap="square" rtlCol="0">
+            <a:spAutoFit/>
+          </a:bodyPr>
+          <a:lstStyle/>
+          <a:p>
+            <a:pPr algn="ctr"/>
+            <a:r>
+              <a:rPr lang="en-US" sz="1600" dirty="0"/>
+              <a:t>Gorilla </a:t>
+            </a:r>
+            <a:r>
+              <a:rPr lang="en-US" sz="1600" dirty="0" err="1"/>
+              <a:t>gorilla</a:t>
+            </a:r>
+            <a:r>
+              <a:rPr lang="en-US" sz="1600" dirty="0"/>
+              <a:t> chromosome 16 (~80M base pairs)</a:t>
+            </a:r>
+            <a:endParaRPr lang="sr-Latn-RS" sz="1600" dirty="0"/>
+          </a:p>
+        </p:txBody>
+      </p:sp>
     </p:spTree>
     <p:extLst>
       <p:ext uri="{BB962C8B-B14F-4D97-AF65-F5344CB8AC3E}">
@@ -6302,58 +6302,9 @@
           </a:p>
         </p:txBody>
       </p:sp>
-      <p:sp>
-        <p:nvSpPr>
-          <p:cNvPr id="3" name="TextBox 2">
-            <a:extLst>
-              <a:ext uri="{FF2B5EF4-FFF2-40B4-BE49-F238E27FC236}">
-                <a16:creationId xmlns:a16="http://schemas.microsoft.com/office/drawing/2014/main" xmlns="" id="{F4949662-0FB6-4E5C-990C-06D0EFC77E0D}"/>
-              </a:ext>
-            </a:extLst>
-          </p:cNvPr>
-          <p:cNvSpPr txBox="1"/>
-          <p:nvPr/>
-        </p:nvSpPr>
-        <p:spPr>
-          <a:xfrm>
-            <a:off x="650928" y="6218321"/>
-            <a:ext cx="7987746" cy="338554"/>
-          </a:xfrm>
-          <a:prstGeom prst="rect">
-            <a:avLst/>
-          </a:prstGeom>
-          <a:noFill/>
-        </p:spPr>
-        <p:txBody>
-          <a:bodyPr wrap="square" rtlCol="0">
-            <a:spAutoFit/>
-          </a:bodyPr>
-          <a:lstStyle/>
-          <a:p>
-            <a:pPr algn="ctr"/>
-            <a:r>
-              <a:rPr lang="sr-Latn-RS" sz="1600" dirty="0"/>
-              <a:t>Spodoptera</a:t>
-            </a:r>
-            <a:r>
-              <a:rPr lang="en-US" sz="1600" dirty="0"/>
-              <a:t> </a:t>
-            </a:r>
-            <a:r>
-              <a:rPr lang="sr-Latn-RS" sz="1600" dirty="0"/>
-              <a:t>litura</a:t>
-            </a:r>
-            <a:r>
-              <a:rPr lang="en-US" sz="1600" dirty="0"/>
-              <a:t> chromosome 12 (~10M base pairs)</a:t>
-            </a:r>
-            <a:endParaRPr lang="sr-Latn-RS" sz="1600" dirty="0"/>
-          </a:p>
-        </p:txBody>
-      </p:sp>
       <p:pic>
         <p:nvPicPr>
-          <p:cNvPr id="4" name="Picture 3"/>
+          <p:cNvPr id="6" name="Picture 5"/>
           <p:cNvPicPr>
             <a:picLocks noChangeAspect="1"/>
           </p:cNvPicPr>
@@ -6373,14 +6324,63 @@
         </p:blipFill>
         <p:spPr>
           <a:xfrm>
-            <a:off x="370002" y="1448418"/>
-            <a:ext cx="9104664" cy="4552332"/>
+            <a:off x="410705" y="1541024"/>
+            <a:ext cx="8493071" cy="4495960"/>
           </a:xfrm>
           <a:prstGeom prst="rect">
             <a:avLst/>
           </a:prstGeom>
         </p:spPr>
       </p:pic>
+      <p:sp>
+        <p:nvSpPr>
+          <p:cNvPr id="3" name="TextBox 2">
+            <a:extLst>
+              <a:ext uri="{FF2B5EF4-FFF2-40B4-BE49-F238E27FC236}">
+                <a16:creationId xmlns:a16="http://schemas.microsoft.com/office/drawing/2014/main" xmlns="" id="{F4949662-0FB6-4E5C-990C-06D0EFC77E0D}"/>
+              </a:ext>
+            </a:extLst>
+          </p:cNvPr>
+          <p:cNvSpPr txBox="1"/>
+          <p:nvPr/>
+        </p:nvSpPr>
+        <p:spPr>
+          <a:xfrm>
+            <a:off x="650928" y="5799221"/>
+            <a:ext cx="7987746" cy="338554"/>
+          </a:xfrm>
+          <a:prstGeom prst="rect">
+            <a:avLst/>
+          </a:prstGeom>
+          <a:noFill/>
+        </p:spPr>
+        <p:txBody>
+          <a:bodyPr wrap="square" rtlCol="0">
+            <a:spAutoFit/>
+          </a:bodyPr>
+          <a:lstStyle/>
+          <a:p>
+            <a:pPr algn="ctr"/>
+            <a:r>
+              <a:rPr lang="sr-Latn-RS" sz="1600" dirty="0"/>
+              <a:t>Spodoptera</a:t>
+            </a:r>
+            <a:r>
+              <a:rPr lang="en-US" sz="1600" dirty="0"/>
+              <a:t> </a:t>
+            </a:r>
+            <a:r>
+              <a:rPr lang="sr-Latn-RS" sz="1600" dirty="0"/>
+              <a:t>litura</a:t>
+            </a:r>
+            <a:r>
+              <a:rPr lang="en-US" sz="1600" dirty="0"/>
+              <a:t> chromosome 12 (~10M base pairs)</a:t>
+            </a:r>
+            <a:endParaRPr lang="sr-Latn-RS" sz="1600" dirty="0"/>
+          </a:p>
+        </p:txBody>
+      </p:sp>
     </p:spTree>
     <p:extLst>
       <p:ext uri="{BB962C8B-B14F-4D97-AF65-F5344CB8AC3E}">
@@ -6540,7 +6540,12 @@
             <p:ph type="title"/>
           </p:nvPr>
         </p:nvSpPr>
-        <p:spPr/>
+        <p:spPr>
+          <a:xfrm>
+            <a:off x="650928" y="306890"/>
+            <a:ext cx="8596668" cy="809625"/>
+          </a:xfrm>
+        </p:spPr>
         <p:txBody>
           <a:bodyPr>
             <a:normAutofit/>
@@ -6568,7 +6573,7 @@
         </p:nvSpPr>
         <p:spPr>
           <a:xfrm>
-            <a:off x="650928" y="6256421"/>
+            <a:off x="650928" y="6123740"/>
             <a:ext cx="7987746" cy="338554"/>
           </a:xfrm>
           <a:prstGeom prst="rect">
@@ -6625,8 +6630,8 @@
         </p:blipFill>
         <p:spPr>
           <a:xfrm>
-            <a:off x="800100" y="1290065"/>
-            <a:ext cx="7905750" cy="4965821"/>
+            <a:off x="247201" y="1116515"/>
+            <a:ext cx="9211124" cy="4730331"/>
           </a:xfrm>
           <a:prstGeom prst="rect">
             <a:avLst/>
@@ -6673,7 +6678,12 @@
             <p:ph type="title"/>
           </p:nvPr>
         </p:nvSpPr>
-        <p:spPr/>
+        <p:spPr>
+          <a:xfrm>
+            <a:off x="650928" y="276225"/>
+            <a:ext cx="8596668" cy="838200"/>
+          </a:xfrm>
+        </p:spPr>
         <p:txBody>
           <a:bodyPr/>
           <a:lstStyle/>
@@ -6699,7 +6709,7 @@
         </p:nvSpPr>
         <p:spPr>
           <a:xfrm>
-            <a:off x="650928" y="6284996"/>
+            <a:off x="650928" y="6039519"/>
             <a:ext cx="7987746" cy="338554"/>
           </a:xfrm>
           <a:prstGeom prst="rect">
@@ -6719,7 +6729,7 @@
               <a:t>Gorilla </a:t>
             </a:r>
             <a:r>
-              <a:rPr lang="en-US" sz="1600" dirty="0"/>
+              <a:rPr lang="en-US" sz="1600" dirty="0" err="1"/>
               <a:t>gorilla</a:t>
             </a:r>
             <a:r>
@@ -6752,8 +6762,8 @@
         </p:blipFill>
         <p:spPr>
           <a:xfrm>
-            <a:off x="1295399" y="1278015"/>
-            <a:ext cx="7000875" cy="5014420"/>
+            <a:off x="284707" y="1340902"/>
+            <a:ext cx="9167334" cy="4458319"/>
           </a:xfrm>
           <a:prstGeom prst="rect">
             <a:avLst/>
@@ -6800,7 +6810,12 @@
             <p:ph type="title"/>
           </p:nvPr>
         </p:nvSpPr>
-        <p:spPr/>
+        <p:spPr>
+          <a:xfrm>
+            <a:off x="650928" y="419100"/>
+            <a:ext cx="8596668" cy="858939"/>
+          </a:xfrm>
+        </p:spPr>
         <p:txBody>
           <a:bodyPr/>
           <a:lstStyle/>
@@ -6826,7 +6841,7 @@
         </p:nvSpPr>
         <p:spPr>
           <a:xfrm>
-            <a:off x="650928" y="6218321"/>
+            <a:off x="650928" y="6237371"/>
             <a:ext cx="7987746" cy="338554"/>
           </a:xfrm>
           <a:prstGeom prst="rect">
@@ -6883,8 +6898,8 @@
         </p:blipFill>
         <p:spPr>
           <a:xfrm>
-            <a:off x="571500" y="1390054"/>
-            <a:ext cx="9221660" cy="4675867"/>
+            <a:off x="351777" y="1468539"/>
+            <a:ext cx="9262305" cy="4427436"/>
           </a:xfrm>
           <a:prstGeom prst="rect">
             <a:avLst/>

</xml_diff>